<commit_message>
ppt9 and ppt 12
</commit_message>
<xml_diff>
--- a/JAVA周日班/课件/Java8.pptx
+++ b/JAVA周日班/课件/Java8.pptx
@@ -392,7 +392,7 @@
     </p:spTree>
     <p:extLst>
       <p:ext uri="{BB962C8B-B14F-4D97-AF65-F5344CB8AC3E}">
-        <p14:creationId xmlns="" xmlns:p14="http://schemas.microsoft.com/office/powerpoint/2010/main" val="3422343151"/>
+        <p14:creationId xmlns:p14="http://schemas.microsoft.com/office/powerpoint/2010/main" val="3422343151"/>
       </p:ext>
     </p:extLst>
   </p:cSld>
@@ -2756,8 +2756,8 @@
               <a:t>第</a:t>
             </a:r>
             <a:r>
-              <a:rPr lang="en-US" altLang="zh-CN" dirty="0" smtClean="0"/>
-              <a:t>7</a:t>
+              <a:rPr lang="en-US" altLang="zh-CN" dirty="0"/>
+              <a:t>8</a:t>
             </a:r>
             <a:r>
               <a:rPr lang="zh-CN" altLang="en-US" smtClean="0"/>
@@ -3294,11 +3294,7 @@
           <a:p>
             <a:r>
               <a:rPr lang="zh-CN" altLang="en-US" dirty="0" smtClean="0"/>
-              <a:t>下节</a:t>
-            </a:r>
-            <a:r>
-              <a:rPr lang="zh-CN" altLang="en-US" dirty="0" smtClean="0"/>
-              <a:t>课预告</a:t>
+              <a:t>下节课预告</a:t>
             </a:r>
             <a:endParaRPr lang="zh-CN" altLang="en-US" dirty="0"/>
           </a:p>
@@ -3555,11 +3551,7 @@
             </a:r>
             <a:r>
               <a:rPr lang="zh-CN" altLang="en-US" dirty="0" smtClean="0"/>
-              <a:t>类</a:t>
-            </a:r>
-            <a:r>
-              <a:rPr lang="zh-CN" altLang="en-US" dirty="0" smtClean="0"/>
-              <a:t>中的方法</a:t>
+              <a:t>类中的方法</a:t>
             </a:r>
             <a:endParaRPr lang="en-US" altLang="zh-CN" dirty="0" smtClean="0"/>
           </a:p>
@@ -3582,11 +3574,7 @@
             </a:r>
             <a:r>
               <a:rPr lang="zh-CN" altLang="en-US" dirty="0" smtClean="0"/>
-              <a:t>的</a:t>
-            </a:r>
-            <a:r>
-              <a:rPr lang="zh-CN" altLang="en-US" dirty="0" smtClean="0"/>
-              <a:t>区别</a:t>
+              <a:t>的区别</a:t>
             </a:r>
             <a:endParaRPr lang="en-US" altLang="zh-CN" dirty="0" smtClean="0"/>
           </a:p>
@@ -3745,11 +3733,7 @@
             </a:pPr>
             <a:r>
               <a:rPr lang="en-US" altLang="zh-CN" sz="1600" dirty="0" smtClean="0"/>
-              <a:t>s</a:t>
-            </a:r>
-            <a:r>
-              <a:rPr lang="en-US" altLang="zh-CN" sz="1600" dirty="0" smtClean="0"/>
-              <a:t>ubstring()</a:t>
+              <a:t>substring()</a:t>
             </a:r>
           </a:p>
           <a:p>
@@ -3773,11 +3757,7 @@
             </a:pPr>
             <a:r>
               <a:rPr lang="en-US" altLang="zh-CN" sz="1600" dirty="0" smtClean="0"/>
-              <a:t>e</a:t>
-            </a:r>
-            <a:r>
-              <a:rPr lang="en-US" altLang="zh-CN" sz="1600" dirty="0" smtClean="0"/>
-              <a:t>quals</a:t>
+              <a:t>equals</a:t>
             </a:r>
           </a:p>
           <a:p>
@@ -3820,11 +3800,7 @@
             </a:pPr>
             <a:r>
               <a:rPr lang="en-US" altLang="zh-CN" sz="1600" dirty="0" smtClean="0"/>
-              <a:t>r</a:t>
-            </a:r>
-            <a:r>
-              <a:rPr lang="en-US" altLang="zh-CN" sz="1600" dirty="0" smtClean="0"/>
-              <a:t>eplace</a:t>
+              <a:t>replace</a:t>
             </a:r>
           </a:p>
           <a:p>
@@ -4260,11 +4236,7 @@
             </a:pPr>
             <a:r>
               <a:rPr lang="en-US" altLang="zh-CN" dirty="0" smtClean="0"/>
-              <a:t>f</a:t>
-            </a:r>
-            <a:r>
-              <a:rPr lang="en-US" altLang="zh-CN" dirty="0" smtClean="0"/>
-              <a:t>loor,</a:t>
+              <a:t>floor,</a:t>
             </a:r>
           </a:p>
           <a:p>
@@ -4274,11 +4246,7 @@
             </a:pPr>
             <a:r>
               <a:rPr lang="en-US" altLang="zh-CN" dirty="0" smtClean="0"/>
-              <a:t>c</a:t>
-            </a:r>
-            <a:r>
-              <a:rPr lang="en-US" altLang="zh-CN" dirty="0" smtClean="0"/>
-              <a:t>eil</a:t>
+              <a:t>ceil</a:t>
             </a:r>
           </a:p>
           <a:p>
@@ -4288,11 +4256,7 @@
             </a:pPr>
             <a:r>
               <a:rPr lang="en-US" altLang="zh-CN" dirty="0" smtClean="0"/>
-              <a:t>r</a:t>
-            </a:r>
-            <a:r>
-              <a:rPr lang="en-US" altLang="zh-CN" dirty="0" smtClean="0"/>
-              <a:t>ound</a:t>
+              <a:t>round</a:t>
             </a:r>
           </a:p>
           <a:p>
@@ -4302,11 +4266,7 @@
             </a:pPr>
             <a:r>
               <a:rPr lang="en-US" altLang="zh-CN" dirty="0" smtClean="0"/>
-              <a:t>a</a:t>
-            </a:r>
-            <a:r>
-              <a:rPr lang="en-US" altLang="zh-CN" dirty="0" smtClean="0"/>
-              <a:t>bs</a:t>
+              <a:t>abs</a:t>
             </a:r>
           </a:p>
           <a:p>

</xml_diff>